<commit_message>
modificaciones de los arboles
</commit_message>
<xml_diff>
--- a/Arboles/DoWhile.pptx
+++ b/Arboles/DoWhile.pptx
@@ -244,7 +244,7 @@
           <a:p>
             <a:fld id="{A24D1F3A-D1EF-447E-A819-3BB187B73454}" type="datetimeFigureOut">
               <a:rPr lang="en-US" smtClean="0"/>
-              <a:t>7/27/2022</a:t>
+              <a:t>8/1/2022</a:t>
             </a:fld>
             <a:endParaRPr lang="en-US"/>
           </a:p>
@@ -414,7 +414,7 @@
           <a:p>
             <a:fld id="{A24D1F3A-D1EF-447E-A819-3BB187B73454}" type="datetimeFigureOut">
               <a:rPr lang="en-US" smtClean="0"/>
-              <a:t>7/27/2022</a:t>
+              <a:t>8/1/2022</a:t>
             </a:fld>
             <a:endParaRPr lang="en-US"/>
           </a:p>
@@ -594,7 +594,7 @@
           <a:p>
             <a:fld id="{A24D1F3A-D1EF-447E-A819-3BB187B73454}" type="datetimeFigureOut">
               <a:rPr lang="en-US" smtClean="0"/>
-              <a:t>7/27/2022</a:t>
+              <a:t>8/1/2022</a:t>
             </a:fld>
             <a:endParaRPr lang="en-US"/>
           </a:p>
@@ -764,7 +764,7 @@
           <a:p>
             <a:fld id="{A24D1F3A-D1EF-447E-A819-3BB187B73454}" type="datetimeFigureOut">
               <a:rPr lang="en-US" smtClean="0"/>
-              <a:t>7/27/2022</a:t>
+              <a:t>8/1/2022</a:t>
             </a:fld>
             <a:endParaRPr lang="en-US"/>
           </a:p>
@@ -1010,7 +1010,7 @@
           <a:p>
             <a:fld id="{A24D1F3A-D1EF-447E-A819-3BB187B73454}" type="datetimeFigureOut">
               <a:rPr lang="en-US" smtClean="0"/>
-              <a:t>7/27/2022</a:t>
+              <a:t>8/1/2022</a:t>
             </a:fld>
             <a:endParaRPr lang="en-US"/>
           </a:p>
@@ -1242,7 +1242,7 @@
           <a:p>
             <a:fld id="{A24D1F3A-D1EF-447E-A819-3BB187B73454}" type="datetimeFigureOut">
               <a:rPr lang="en-US" smtClean="0"/>
-              <a:t>7/27/2022</a:t>
+              <a:t>8/1/2022</a:t>
             </a:fld>
             <a:endParaRPr lang="en-US"/>
           </a:p>
@@ -1609,7 +1609,7 @@
           <a:p>
             <a:fld id="{A24D1F3A-D1EF-447E-A819-3BB187B73454}" type="datetimeFigureOut">
               <a:rPr lang="en-US" smtClean="0"/>
-              <a:t>7/27/2022</a:t>
+              <a:t>8/1/2022</a:t>
             </a:fld>
             <a:endParaRPr lang="en-US"/>
           </a:p>
@@ -1727,7 +1727,7 @@
           <a:p>
             <a:fld id="{A24D1F3A-D1EF-447E-A819-3BB187B73454}" type="datetimeFigureOut">
               <a:rPr lang="en-US" smtClean="0"/>
-              <a:t>7/27/2022</a:t>
+              <a:t>8/1/2022</a:t>
             </a:fld>
             <a:endParaRPr lang="en-US"/>
           </a:p>
@@ -1822,7 +1822,7 @@
           <a:p>
             <a:fld id="{A24D1F3A-D1EF-447E-A819-3BB187B73454}" type="datetimeFigureOut">
               <a:rPr lang="en-US" smtClean="0"/>
-              <a:t>7/27/2022</a:t>
+              <a:t>8/1/2022</a:t>
             </a:fld>
             <a:endParaRPr lang="en-US"/>
           </a:p>
@@ -2099,7 +2099,7 @@
           <a:p>
             <a:fld id="{A24D1F3A-D1EF-447E-A819-3BB187B73454}" type="datetimeFigureOut">
               <a:rPr lang="en-US" smtClean="0"/>
-              <a:t>7/27/2022</a:t>
+              <a:t>8/1/2022</a:t>
             </a:fld>
             <a:endParaRPr lang="en-US"/>
           </a:p>
@@ -2352,7 +2352,7 @@
           <a:p>
             <a:fld id="{A24D1F3A-D1EF-447E-A819-3BB187B73454}" type="datetimeFigureOut">
               <a:rPr lang="en-US" smtClean="0"/>
-              <a:t>7/27/2022</a:t>
+              <a:t>8/1/2022</a:t>
             </a:fld>
             <a:endParaRPr lang="en-US"/>
           </a:p>
@@ -2565,7 +2565,7 @@
           <a:p>
             <a:fld id="{A24D1F3A-D1EF-447E-A819-3BB187B73454}" type="datetimeFigureOut">
               <a:rPr lang="en-US" smtClean="0"/>
-              <a:t>7/27/2022</a:t>
+              <a:t>8/1/2022</a:t>
             </a:fld>
             <a:endParaRPr lang="en-US"/>
           </a:p>
@@ -3129,8 +3129,8 @@
         </p:nvSpPr>
         <p:spPr>
           <a:xfrm>
-            <a:off x="5002301" y="0"/>
-            <a:ext cx="869149" cy="276999"/>
+            <a:off x="5105224" y="168812"/>
+            <a:ext cx="928459" cy="292388"/>
           </a:xfrm>
           <a:prstGeom prst="rect">
             <a:avLst/>
@@ -3144,10 +3144,10 @@
           <a:lstStyle/>
           <a:p>
             <a:r>
-              <a:rPr lang="es-ES" sz="1200" dirty="0"/>
+              <a:rPr lang="es-ES" sz="1300" dirty="0"/>
               <a:t>DO_WHILE</a:t>
             </a:r>
-            <a:endParaRPr lang="en-US" sz="1200" dirty="0"/>
+            <a:endParaRPr lang="en-US" sz="1300" dirty="0"/>
           </a:p>
         </p:txBody>
       </p:sp>
@@ -3159,8 +3159,8 @@
         </p:nvSpPr>
         <p:spPr>
           <a:xfrm>
-            <a:off x="2261511" y="1585549"/>
-            <a:ext cx="360996" cy="276999"/>
+            <a:off x="328624" y="1585549"/>
+            <a:ext cx="375424" cy="292388"/>
           </a:xfrm>
           <a:prstGeom prst="rect">
             <a:avLst/>
@@ -3174,10 +3174,10 @@
           <a:lstStyle/>
           <a:p>
             <a:r>
-              <a:rPr lang="es-ES" sz="1200" dirty="0"/>
+              <a:rPr lang="es-ES" sz="1300" dirty="0"/>
               <a:t>Do</a:t>
             </a:r>
-            <a:endParaRPr lang="en-US" sz="1200" dirty="0"/>
+            <a:endParaRPr lang="en-US" sz="1300" dirty="0"/>
           </a:p>
         </p:txBody>
       </p:sp>
@@ -3190,7 +3190,7 @@
         <p:spPr>
           <a:xfrm>
             <a:off x="5922705" y="1575171"/>
-            <a:ext cx="231154" cy="276999"/>
+            <a:ext cx="235962" cy="292388"/>
           </a:xfrm>
           <a:prstGeom prst="rect">
             <a:avLst/>
@@ -3204,10 +3204,10 @@
           <a:lstStyle/>
           <a:p>
             <a:r>
-              <a:rPr lang="es-ES" sz="1200" dirty="0"/>
+              <a:rPr lang="es-ES" sz="1300" dirty="0"/>
               <a:t>(</a:t>
             </a:r>
-            <a:endParaRPr lang="en-US" sz="1200" dirty="0"/>
+            <a:endParaRPr lang="en-US" sz="1300" dirty="0"/>
           </a:p>
         </p:txBody>
       </p:sp>
@@ -3219,8 +3219,8 @@
         </p:nvSpPr>
         <p:spPr>
           <a:xfrm>
-            <a:off x="3274255" y="1575171"/>
-            <a:ext cx="889987" cy="276999"/>
+            <a:off x="1923382" y="1589637"/>
+            <a:ext cx="947695" cy="292388"/>
           </a:xfrm>
           <a:prstGeom prst="rect">
             <a:avLst/>
@@ -3234,10 +3234,10 @@
           <a:lstStyle/>
           <a:p>
             <a:r>
-              <a:rPr lang="es-ES" sz="1200" dirty="0"/>
+              <a:rPr lang="es-ES" sz="1300" dirty="0"/>
               <a:t>SENTENCIA</a:t>
             </a:r>
-            <a:endParaRPr lang="en-US" sz="1200" dirty="0"/>
+            <a:endParaRPr lang="en-US" sz="1300" dirty="0"/>
           </a:p>
         </p:txBody>
       </p:sp>
@@ -3249,8 +3249,8 @@
         </p:nvSpPr>
         <p:spPr>
           <a:xfrm>
-            <a:off x="9581145" y="1585549"/>
-            <a:ext cx="231154" cy="276999"/>
+            <a:off x="10546904" y="1602776"/>
+            <a:ext cx="235962" cy="292388"/>
           </a:xfrm>
           <a:prstGeom prst="rect">
             <a:avLst/>
@@ -3264,10 +3264,10 @@
           <a:lstStyle/>
           <a:p>
             <a:r>
-              <a:rPr lang="es-ES" sz="1200" dirty="0"/>
+              <a:rPr lang="es-ES" sz="1300" dirty="0"/>
               <a:t>)</a:t>
             </a:r>
-            <a:endParaRPr lang="en-US" sz="1200" dirty="0"/>
+            <a:endParaRPr lang="en-US" sz="1300" dirty="0"/>
           </a:p>
         </p:txBody>
       </p:sp>
@@ -3279,8 +3279,8 @@
         </p:nvSpPr>
         <p:spPr>
           <a:xfrm>
-            <a:off x="10202697" y="1585549"/>
-            <a:ext cx="226344" cy="276999"/>
+            <a:off x="11168456" y="1602776"/>
+            <a:ext cx="229550" cy="292388"/>
           </a:xfrm>
           <a:prstGeom prst="rect">
             <a:avLst/>
@@ -3294,10 +3294,10 @@
           <a:lstStyle/>
           <a:p>
             <a:r>
-              <a:rPr lang="es-ES" sz="1200" dirty="0"/>
+              <a:rPr lang="es-ES" sz="1300" dirty="0"/>
               <a:t>;</a:t>
             </a:r>
-            <a:endParaRPr lang="en-US" sz="1200" dirty="0"/>
+            <a:endParaRPr lang="en-US" sz="1300" dirty="0"/>
           </a:p>
         </p:txBody>
       </p:sp>
@@ -3309,8 +3309,8 @@
         </p:nvSpPr>
         <p:spPr>
           <a:xfrm>
-            <a:off x="2979657" y="1580360"/>
-            <a:ext cx="232756" cy="276999"/>
+            <a:off x="1143091" y="1578404"/>
+            <a:ext cx="237566" cy="292388"/>
           </a:xfrm>
           <a:prstGeom prst="rect">
             <a:avLst/>
@@ -3324,10 +3324,10 @@
           <a:lstStyle/>
           <a:p>
             <a:r>
-              <a:rPr lang="es-ES" sz="1200" dirty="0"/>
+              <a:rPr lang="es-ES" sz="1300" dirty="0"/>
               <a:t>{</a:t>
             </a:r>
-            <a:endParaRPr lang="en-US" sz="1200" dirty="0"/>
+            <a:endParaRPr lang="en-US" sz="1300" dirty="0"/>
           </a:p>
         </p:txBody>
       </p:sp>
@@ -3339,8 +3339,8 @@
         </p:nvSpPr>
         <p:spPr>
           <a:xfrm>
-            <a:off x="4480159" y="1575171"/>
-            <a:ext cx="232756" cy="276999"/>
+            <a:off x="3299198" y="1589637"/>
+            <a:ext cx="237566" cy="292388"/>
           </a:xfrm>
           <a:prstGeom prst="rect">
             <a:avLst/>
@@ -3354,10 +3354,10 @@
           <a:lstStyle/>
           <a:p>
             <a:r>
-              <a:rPr lang="es-ES" sz="1200" dirty="0"/>
+              <a:rPr lang="es-ES" sz="1300" dirty="0"/>
               <a:t>}</a:t>
             </a:r>
-            <a:endParaRPr lang="en-US" sz="1200" dirty="0"/>
+            <a:endParaRPr lang="en-US" sz="1300" dirty="0"/>
           </a:p>
         </p:txBody>
       </p:sp>
@@ -3370,7 +3370,7 @@
         <p:spPr>
           <a:xfrm>
             <a:off x="4933601" y="1585549"/>
-            <a:ext cx="548548" cy="276999"/>
+            <a:ext cx="582211" cy="292388"/>
           </a:xfrm>
           <a:prstGeom prst="rect">
             <a:avLst/>
@@ -3384,10 +3384,10 @@
           <a:lstStyle/>
           <a:p>
             <a:r>
-              <a:rPr lang="es-ES" sz="1200" dirty="0"/>
+              <a:rPr lang="es-ES" sz="1300" dirty="0"/>
               <a:t>While</a:t>
             </a:r>
-            <a:endParaRPr lang="en-US" sz="1200" dirty="0"/>
+            <a:endParaRPr lang="en-US" sz="1300" dirty="0"/>
           </a:p>
         </p:txBody>
       </p:sp>
@@ -3399,8 +3399,8 @@
         </p:nvSpPr>
         <p:spPr>
           <a:xfrm>
-            <a:off x="6697280" y="1585549"/>
-            <a:ext cx="2360818" cy="461665"/>
+            <a:off x="7514798" y="1585549"/>
+            <a:ext cx="2564980" cy="292388"/>
           </a:xfrm>
           <a:prstGeom prst="rect">
             <a:avLst/>
@@ -3414,13 +3414,10 @@
           <a:lstStyle/>
           <a:p>
             <a:r>
-              <a:rPr lang="es-ES" sz="1200" dirty="0"/>
+              <a:rPr lang="es-ES" sz="1300" dirty="0" smtClean="0"/>
               <a:t>SENTENCIA_BOOLENA_ANIDADA</a:t>
             </a:r>
-            <a:endParaRPr lang="en-US" sz="1200" dirty="0"/>
-          </a:p>
-          <a:p>
-            <a:endParaRPr lang="en-US" sz="1200" dirty="0"/>
+            <a:endParaRPr lang="en-US" sz="1300" dirty="0"/>
           </a:p>
         </p:txBody>
       </p:sp>
@@ -3435,8 +3432,8 @@
         </p:nvCxnSpPr>
         <p:spPr>
           <a:xfrm flipH="1">
-            <a:off x="2442009" y="276999"/>
-            <a:ext cx="2994867" cy="1308550"/>
+            <a:off x="516336" y="461200"/>
+            <a:ext cx="5053118" cy="1124349"/>
           </a:xfrm>
           <a:prstGeom prst="line">
             <a:avLst/>
@@ -3468,8 +3465,8 @@
         </p:nvCxnSpPr>
         <p:spPr>
           <a:xfrm>
-            <a:off x="5436876" y="276999"/>
-            <a:ext cx="601406" cy="1298172"/>
+            <a:off x="5569454" y="461200"/>
+            <a:ext cx="471232" cy="1113971"/>
           </a:xfrm>
           <a:prstGeom prst="line">
             <a:avLst/>
@@ -3501,8 +3498,8 @@
         </p:nvCxnSpPr>
         <p:spPr>
           <a:xfrm flipH="1">
-            <a:off x="3719249" y="276999"/>
-            <a:ext cx="1717627" cy="1298172"/>
+            <a:off x="2397230" y="461200"/>
+            <a:ext cx="3172224" cy="1128437"/>
           </a:xfrm>
           <a:prstGeom prst="line">
             <a:avLst/>
@@ -3534,8 +3531,8 @@
         </p:nvCxnSpPr>
         <p:spPr>
           <a:xfrm>
-            <a:off x="5436876" y="276999"/>
-            <a:ext cx="4259846" cy="1308550"/>
+            <a:off x="5569454" y="461200"/>
+            <a:ext cx="5095431" cy="1141576"/>
           </a:xfrm>
           <a:prstGeom prst="line">
             <a:avLst/>
@@ -3567,8 +3564,8 @@
         </p:nvCxnSpPr>
         <p:spPr>
           <a:xfrm flipH="1">
-            <a:off x="3096035" y="276999"/>
-            <a:ext cx="2340841" cy="1303361"/>
+            <a:off x="1261874" y="461200"/>
+            <a:ext cx="4307580" cy="1117204"/>
           </a:xfrm>
           <a:prstGeom prst="line">
             <a:avLst/>
@@ -3600,8 +3597,8 @@
         </p:nvCxnSpPr>
         <p:spPr>
           <a:xfrm flipH="1">
-            <a:off x="5207875" y="276999"/>
-            <a:ext cx="229001" cy="1308550"/>
+            <a:off x="5224707" y="461200"/>
+            <a:ext cx="344747" cy="1124349"/>
           </a:xfrm>
           <a:prstGeom prst="line">
             <a:avLst/>
@@ -3634,8 +3631,8 @@
         </p:nvCxnSpPr>
         <p:spPr>
           <a:xfrm>
-            <a:off x="5436876" y="276999"/>
-            <a:ext cx="2440813" cy="1308550"/>
+            <a:off x="5569454" y="461200"/>
+            <a:ext cx="3227834" cy="1124349"/>
           </a:xfrm>
           <a:prstGeom prst="line">
             <a:avLst/>
@@ -3667,8 +3664,8 @@
         </p:nvCxnSpPr>
         <p:spPr>
           <a:xfrm>
-            <a:off x="5436876" y="276999"/>
-            <a:ext cx="4878993" cy="1308550"/>
+            <a:off x="5569454" y="461200"/>
+            <a:ext cx="5713777" cy="1141576"/>
           </a:xfrm>
           <a:prstGeom prst="line">
             <a:avLst/>
@@ -3700,8 +3697,8 @@
         </p:nvCxnSpPr>
         <p:spPr>
           <a:xfrm flipH="1">
-            <a:off x="4596537" y="276999"/>
-            <a:ext cx="840339" cy="1298172"/>
+            <a:off x="3417981" y="461200"/>
+            <a:ext cx="2151473" cy="1128437"/>
           </a:xfrm>
           <a:prstGeom prst="line">
             <a:avLst/>
@@ -3740,12 +3737,17 @@
         </p:nvCxnSpPr>
         <p:spPr>
           <a:xfrm flipH="1">
-            <a:off x="1963684" y="1852170"/>
-            <a:ext cx="1755565" cy="579263"/>
+            <a:off x="1300388" y="1882025"/>
+            <a:ext cx="1096842" cy="564473"/>
           </a:xfrm>
           <a:prstGeom prst="line">
             <a:avLst/>
           </a:prstGeom>
+          <a:ln>
+            <a:solidFill>
+              <a:schemeClr val="accent6"/>
+            </a:solidFill>
+          </a:ln>
         </p:spPr>
         <p:style>
           <a:lnRef idx="1">
@@ -3776,8 +3778,8 @@
         </p:nvSpPr>
         <p:spPr>
           <a:xfrm>
-            <a:off x="1692487" y="2431433"/>
-            <a:ext cx="542393" cy="276999"/>
+            <a:off x="1014829" y="2446498"/>
+            <a:ext cx="571118" cy="292388"/>
           </a:xfrm>
           <a:prstGeom prst="rect">
             <a:avLst/>
@@ -3790,10 +3792,10 @@
           <a:lstStyle/>
           <a:p>
             <a:r>
-              <a:rPr lang="es-ES" sz="1200" dirty="0"/>
+              <a:rPr lang="es-ES" sz="1300" dirty="0"/>
               <a:t>COUT</a:t>
             </a:r>
-            <a:endParaRPr lang="en-US" sz="1200" dirty="0"/>
+            <a:endParaRPr lang="en-US" sz="1300" dirty="0"/>
           </a:p>
         </p:txBody>
       </p:sp>
@@ -3811,8 +3813,8 @@
         </p:nvSpPr>
         <p:spPr>
           <a:xfrm>
-            <a:off x="6058981" y="2451822"/>
-            <a:ext cx="2539541" cy="276999"/>
+            <a:off x="7431273" y="2437317"/>
+            <a:ext cx="2732030" cy="292388"/>
           </a:xfrm>
           <a:prstGeom prst="rect">
             <a:avLst/>
@@ -3826,7 +3828,7 @@
           <a:lstStyle/>
           <a:p>
             <a:r>
-              <a:rPr lang="en-US" sz="1200" dirty="0"/>
+              <a:rPr lang="en-US" sz="1300" dirty="0"/>
               <a:t>SENTENCIA_BOOLEANA_COMPUESTA</a:t>
             </a:r>
           </a:p>
@@ -3849,13 +3851,18 @@
           <p:nvPr/>
         </p:nvCxnSpPr>
         <p:spPr>
-          <a:xfrm flipH="1">
-            <a:off x="7328752" y="2047214"/>
-            <a:ext cx="548937" cy="404608"/>
+          <a:xfrm>
+            <a:off x="8797288" y="1877937"/>
+            <a:ext cx="0" cy="559380"/>
           </a:xfrm>
           <a:prstGeom prst="line">
             <a:avLst/>
           </a:prstGeom>
+          <a:ln>
+            <a:solidFill>
+              <a:schemeClr val="accent4"/>
+            </a:solidFill>
+          </a:ln>
         </p:spPr>
         <p:style>
           <a:lnRef idx="1">
@@ -3886,8 +3893,8 @@
         </p:nvSpPr>
         <p:spPr>
           <a:xfrm>
-            <a:off x="5578613" y="3595092"/>
-            <a:ext cx="2209195" cy="276999"/>
+            <a:off x="5456258" y="3578207"/>
+            <a:ext cx="2377382" cy="292388"/>
           </a:xfrm>
           <a:prstGeom prst="rect">
             <a:avLst/>
@@ -3901,7 +3908,7 @@
           <a:lstStyle/>
           <a:p>
             <a:r>
-              <a:rPr lang="en-US" sz="1200" dirty="0"/>
+              <a:rPr lang="en-US" sz="1300" dirty="0"/>
               <a:t>SENTENCIA_BOOLEANA_SIMPLE</a:t>
             </a:r>
           </a:p>
@@ -3922,7 +3929,7 @@
         <p:spPr>
           <a:xfrm>
             <a:off x="9812299" y="3595094"/>
-            <a:ext cx="2209195" cy="276999"/>
+            <a:ext cx="2377382" cy="292388"/>
           </a:xfrm>
           <a:prstGeom prst="rect">
             <a:avLst/>
@@ -3936,7 +3943,7 @@
           <a:lstStyle/>
           <a:p>
             <a:r>
-              <a:rPr lang="en-US" sz="1200" dirty="0"/>
+              <a:rPr lang="en-US" sz="1300" dirty="0"/>
               <a:t>SENTENCIA_BOOLEANA_SIMPLE</a:t>
             </a:r>
           </a:p>
@@ -3956,8 +3963,8 @@
         </p:nvSpPr>
         <p:spPr>
           <a:xfrm>
-            <a:off x="7918613" y="3607237"/>
-            <a:ext cx="1849669" cy="276999"/>
+            <a:off x="7782278" y="3595091"/>
+            <a:ext cx="2030021" cy="292388"/>
           </a:xfrm>
           <a:prstGeom prst="rect">
             <a:avLst/>
@@ -3971,10 +3978,10 @@
           <a:lstStyle/>
           <a:p>
             <a:r>
-              <a:rPr lang="es-ES" sz="1200" dirty="0"/>
+              <a:rPr lang="es-ES" sz="1300" dirty="0"/>
               <a:t>OPERADOR_RELACIONAL</a:t>
             </a:r>
-            <a:endParaRPr lang="en-US" sz="1200" dirty="0"/>
+            <a:endParaRPr lang="en-US" sz="1300" dirty="0"/>
           </a:p>
         </p:txBody>
       </p:sp>
@@ -3995,12 +4002,17 @@
         </p:nvCxnSpPr>
         <p:spPr>
           <a:xfrm flipH="1">
-            <a:off x="6683211" y="2728821"/>
-            <a:ext cx="645541" cy="866271"/>
+            <a:off x="6644949" y="2729705"/>
+            <a:ext cx="2152339" cy="848502"/>
           </a:xfrm>
           <a:prstGeom prst="line">
             <a:avLst/>
           </a:prstGeom>
+          <a:ln>
+            <a:solidFill>
+              <a:schemeClr val="accent6"/>
+            </a:solidFill>
+          </a:ln>
         </p:spPr>
         <p:style>
           <a:lnRef idx="1">
@@ -4035,12 +4047,17 @@
         </p:nvCxnSpPr>
         <p:spPr>
           <a:xfrm>
-            <a:off x="7328752" y="2728821"/>
-            <a:ext cx="1514696" cy="878416"/>
+            <a:off x="8797288" y="2729705"/>
+            <a:ext cx="1" cy="865386"/>
           </a:xfrm>
           <a:prstGeom prst="line">
             <a:avLst/>
           </a:prstGeom>
+          <a:ln>
+            <a:solidFill>
+              <a:schemeClr val="accent6"/>
+            </a:solidFill>
+          </a:ln>
         </p:spPr>
         <p:style>
           <a:lnRef idx="1">
@@ -4074,12 +4091,17 @@
         </p:nvCxnSpPr>
         <p:spPr>
           <a:xfrm>
-            <a:off x="7328752" y="2728821"/>
-            <a:ext cx="3588145" cy="866273"/>
+            <a:off x="8797288" y="2729705"/>
+            <a:ext cx="2203702" cy="865389"/>
           </a:xfrm>
           <a:prstGeom prst="line">
             <a:avLst/>
           </a:prstGeom>
+          <a:ln>
+            <a:solidFill>
+              <a:schemeClr val="accent6"/>
+            </a:solidFill>
+          </a:ln>
         </p:spPr>
         <p:style>
           <a:lnRef idx="1">
@@ -4110,8 +4132,8 @@
         </p:nvSpPr>
         <p:spPr>
           <a:xfrm>
-            <a:off x="6038282" y="4633735"/>
-            <a:ext cx="1311706" cy="276999"/>
+            <a:off x="5942673" y="4633735"/>
+            <a:ext cx="1404552" cy="292388"/>
           </a:xfrm>
           <a:prstGeom prst="rect">
             <a:avLst/>
@@ -4124,7 +4146,7 @@
           <a:lstStyle/>
           <a:p>
             <a:r>
-              <a:rPr lang="en-US" sz="1200" dirty="0"/>
+              <a:rPr lang="en-US" sz="1300" dirty="0"/>
               <a:t>IDENTIFICADORES</a:t>
             </a:r>
           </a:p>
@@ -4144,8 +4166,8 @@
         </p:nvSpPr>
         <p:spPr>
           <a:xfrm>
-            <a:off x="6564933" y="5431752"/>
-            <a:ext cx="258404" cy="276999"/>
+            <a:off x="6494220" y="5435049"/>
+            <a:ext cx="264816" cy="292388"/>
           </a:xfrm>
           <a:prstGeom prst="rect">
             <a:avLst/>
@@ -4159,10 +4181,10 @@
           <a:lstStyle/>
           <a:p>
             <a:r>
-              <a:rPr lang="es-ES" sz="1200" dirty="0"/>
+              <a:rPr lang="es-ES" sz="1300" dirty="0"/>
               <a:t>a</a:t>
             </a:r>
-            <a:endParaRPr lang="en-US" sz="1200" dirty="0"/>
+            <a:endParaRPr lang="en-US" sz="1300" dirty="0"/>
           </a:p>
         </p:txBody>
       </p:sp>
@@ -4180,8 +4202,8 @@
         </p:nvSpPr>
         <p:spPr>
           <a:xfrm>
-            <a:off x="8712643" y="4633740"/>
-            <a:ext cx="261610" cy="276999"/>
+            <a:off x="8663277" y="4633735"/>
+            <a:ext cx="268022" cy="292388"/>
           </a:xfrm>
           <a:prstGeom prst="rect">
             <a:avLst/>
@@ -4195,10 +4217,10 @@
           <a:lstStyle/>
           <a:p>
             <a:r>
-              <a:rPr lang="es-ES" sz="1200" dirty="0"/>
+              <a:rPr lang="es-ES" sz="1300" dirty="0"/>
               <a:t>&lt;</a:t>
             </a:r>
-            <a:endParaRPr lang="en-US" sz="1200" dirty="0"/>
+            <a:endParaRPr lang="en-US" sz="1300" dirty="0"/>
           </a:p>
         </p:txBody>
       </p:sp>
@@ -4216,8 +4238,8 @@
         </p:nvSpPr>
         <p:spPr>
           <a:xfrm>
-            <a:off x="10746017" y="4633740"/>
-            <a:ext cx="341760" cy="276999"/>
+            <a:off x="10823698" y="4633735"/>
+            <a:ext cx="354584" cy="292388"/>
           </a:xfrm>
           <a:prstGeom prst="rect">
             <a:avLst/>
@@ -4231,10 +4253,10 @@
           <a:lstStyle/>
           <a:p>
             <a:r>
-              <a:rPr lang="es-ES" sz="1200" dirty="0"/>
+              <a:rPr lang="es-ES" sz="1300" dirty="0"/>
               <a:t>20</a:t>
             </a:r>
-            <a:endParaRPr lang="en-US" sz="1200" dirty="0"/>
+            <a:endParaRPr lang="en-US" sz="1300" dirty="0"/>
           </a:p>
         </p:txBody>
       </p:sp>
@@ -4253,7 +4275,7 @@
         <p:spPr>
           <a:xfrm>
             <a:off x="1591951" y="3600939"/>
-            <a:ext cx="628505" cy="276999"/>
+            <a:ext cx="665118" cy="292388"/>
           </a:xfrm>
           <a:prstGeom prst="rect">
             <a:avLst/>
@@ -4266,7 +4288,7 @@
           <a:lstStyle/>
           <a:p>
             <a:r>
-              <a:rPr lang="en-US" sz="1200" dirty="0"/>
+              <a:rPr lang="en-US" sz="1300" dirty="0"/>
               <a:t>SALIDA</a:t>
             </a:r>
           </a:p>
@@ -4287,7 +4309,7 @@
         <p:spPr>
           <a:xfrm>
             <a:off x="413004" y="3584447"/>
-            <a:ext cx="482691" cy="276999"/>
+            <a:ext cx="482691" cy="492443"/>
           </a:xfrm>
           <a:prstGeom prst="rect">
             <a:avLst/>
@@ -4300,7 +4322,7 @@
           <a:lstStyle/>
           <a:p>
             <a:r>
-              <a:rPr lang="en-US" sz="1200" dirty="0"/>
+              <a:rPr lang="en-US" sz="1300" dirty="0"/>
               <a:t>cout</a:t>
             </a:r>
           </a:p>
@@ -4321,7 +4343,7 @@
         <p:spPr>
           <a:xfrm>
             <a:off x="1072924" y="3584447"/>
-            <a:ext cx="338554" cy="276999"/>
+            <a:ext cx="351378" cy="292388"/>
           </a:xfrm>
           <a:prstGeom prst="rect">
             <a:avLst/>
@@ -4334,7 +4356,7 @@
           <a:lstStyle/>
           <a:p>
             <a:r>
-              <a:rPr lang="en-US" sz="1200" dirty="0"/>
+              <a:rPr lang="en-US" sz="1300" dirty="0"/>
               <a:t>&lt;&lt;</a:t>
             </a:r>
           </a:p>
@@ -4358,12 +4380,17 @@
         </p:nvCxnSpPr>
         <p:spPr>
           <a:xfrm flipH="1">
-            <a:off x="654350" y="2708432"/>
-            <a:ext cx="1309334" cy="876015"/>
+            <a:off x="654350" y="2738886"/>
+            <a:ext cx="646038" cy="845561"/>
           </a:xfrm>
           <a:prstGeom prst="line">
             <a:avLst/>
           </a:prstGeom>
+          <a:ln>
+            <a:solidFill>
+              <a:schemeClr val="accent4"/>
+            </a:solidFill>
+          </a:ln>
         </p:spPr>
         <p:style>
           <a:lnRef idx="1">
@@ -4397,12 +4424,17 @@
         </p:nvCxnSpPr>
         <p:spPr>
           <a:xfrm flipH="1">
-            <a:off x="1242201" y="2708432"/>
-            <a:ext cx="721483" cy="876015"/>
+            <a:off x="1248613" y="2738886"/>
+            <a:ext cx="51775" cy="845561"/>
           </a:xfrm>
           <a:prstGeom prst="line">
             <a:avLst/>
           </a:prstGeom>
+          <a:ln>
+            <a:solidFill>
+              <a:schemeClr val="accent4"/>
+            </a:solidFill>
+          </a:ln>
         </p:spPr>
         <p:style>
           <a:lnRef idx="1">
@@ -4435,13 +4467,18 @@
           <p:nvPr/>
         </p:nvCxnSpPr>
         <p:spPr>
-          <a:xfrm flipH="1">
-            <a:off x="1906204" y="2708432"/>
-            <a:ext cx="57480" cy="892507"/>
+          <a:xfrm>
+            <a:off x="1300388" y="2738886"/>
+            <a:ext cx="624122" cy="862053"/>
           </a:xfrm>
           <a:prstGeom prst="line">
             <a:avLst/>
           </a:prstGeom>
+          <a:ln>
+            <a:solidFill>
+              <a:schemeClr val="accent4"/>
+            </a:solidFill>
+          </a:ln>
         </p:spPr>
         <p:style>
           <a:lnRef idx="1">
@@ -4472,8 +4509,8 @@
         </p:nvSpPr>
         <p:spPr>
           <a:xfrm>
-            <a:off x="2830088" y="4629228"/>
-            <a:ext cx="628505" cy="276999"/>
+            <a:off x="2220911" y="4598409"/>
+            <a:ext cx="665118" cy="292388"/>
           </a:xfrm>
           <a:prstGeom prst="rect">
             <a:avLst/>
@@ -4486,7 +4523,7 @@
           <a:lstStyle/>
           <a:p>
             <a:r>
-              <a:rPr lang="en-US" sz="1200" dirty="0"/>
+              <a:rPr lang="en-US" sz="1300" dirty="0"/>
               <a:t>SALIDA</a:t>
             </a:r>
           </a:p>
@@ -4506,8 +4543,8 @@
         </p:nvSpPr>
         <p:spPr>
           <a:xfrm>
-            <a:off x="2382369" y="4629229"/>
-            <a:ext cx="338554" cy="276999"/>
+            <a:off x="1773192" y="4598410"/>
+            <a:ext cx="351378" cy="292388"/>
           </a:xfrm>
           <a:prstGeom prst="rect">
             <a:avLst/>
@@ -4520,114 +4557,8 @@
           <a:lstStyle/>
           <a:p>
             <a:r>
-              <a:rPr lang="en-US" sz="1200" dirty="0"/>
+              <a:rPr lang="en-US" sz="1300" dirty="0"/>
               <a:t>&lt;&lt;</a:t>
-            </a:r>
-          </a:p>
-        </p:txBody>
-      </p:sp>
-      <p:sp>
-        <p:nvSpPr>
-          <p:cNvPr id="62" name="CuadroTexto 61">
-            <a:extLst>
-              <a:ext uri="{FF2B5EF4-FFF2-40B4-BE49-F238E27FC236}">
-                <a16:creationId xmlns:a16="http://schemas.microsoft.com/office/drawing/2014/main" id="{FA4CB11B-0D0B-4B41-A084-E4B40036032D}"/>
-              </a:ext>
-            </a:extLst>
-          </p:cNvPr>
-          <p:cNvSpPr txBox="1"/>
-          <p:nvPr/>
-        </p:nvSpPr>
-        <p:spPr>
-          <a:xfrm>
-            <a:off x="1882491" y="4629230"/>
-            <a:ext cx="248786" cy="276999"/>
-          </a:xfrm>
-          <a:prstGeom prst="rect">
-            <a:avLst/>
-          </a:prstGeom>
-          <a:noFill/>
-        </p:spPr>
-        <p:txBody>
-          <a:bodyPr wrap="none" rtlCol="0">
-            <a:spAutoFit/>
-          </a:bodyPr>
-          <a:lstStyle/>
-          <a:p>
-            <a:r>
-              <a:rPr lang="es-ES" sz="1200" dirty="0"/>
-              <a:t>”</a:t>
-            </a:r>
-            <a:endParaRPr lang="en-US" sz="1200" dirty="0"/>
-          </a:p>
-        </p:txBody>
-      </p:sp>
-      <p:sp>
-        <p:nvSpPr>
-          <p:cNvPr id="63" name="CuadroTexto 62">
-            <a:extLst>
-              <a:ext uri="{FF2B5EF4-FFF2-40B4-BE49-F238E27FC236}">
-                <a16:creationId xmlns:a16="http://schemas.microsoft.com/office/drawing/2014/main" id="{621FFD3C-E614-4DF1-BEF2-1B5F4A36B0DE}"/>
-              </a:ext>
-            </a:extLst>
-          </p:cNvPr>
-          <p:cNvSpPr txBox="1"/>
-          <p:nvPr/>
-        </p:nvSpPr>
-        <p:spPr>
-          <a:xfrm>
-            <a:off x="278335" y="4629229"/>
-            <a:ext cx="248786" cy="276999"/>
-          </a:xfrm>
-          <a:prstGeom prst="rect">
-            <a:avLst/>
-          </a:prstGeom>
-          <a:noFill/>
-        </p:spPr>
-        <p:txBody>
-          <a:bodyPr wrap="none" rtlCol="0">
-            <a:spAutoFit/>
-          </a:bodyPr>
-          <a:lstStyle/>
-          <a:p>
-            <a:r>
-              <a:rPr lang="es-ES" sz="1200" dirty="0"/>
-              <a:t>“</a:t>
-            </a:r>
-            <a:endParaRPr lang="en-US" sz="1200" dirty="0"/>
-          </a:p>
-        </p:txBody>
-      </p:sp>
-      <p:sp>
-        <p:nvSpPr>
-          <p:cNvPr id="64" name="Rectángulo 63">
-            <a:extLst>
-              <a:ext uri="{FF2B5EF4-FFF2-40B4-BE49-F238E27FC236}">
-                <a16:creationId xmlns:a16="http://schemas.microsoft.com/office/drawing/2014/main" id="{7095932A-FA86-43B6-9455-AA8A59C76867}"/>
-              </a:ext>
-            </a:extLst>
-          </p:cNvPr>
-          <p:cNvSpPr/>
-          <p:nvPr/>
-        </p:nvSpPr>
-        <p:spPr>
-          <a:xfrm>
-            <a:off x="775016" y="4631206"/>
-            <a:ext cx="859580" cy="276999"/>
-          </a:xfrm>
-          <a:prstGeom prst="rect">
-            <a:avLst/>
-          </a:prstGeom>
-        </p:spPr>
-        <p:txBody>
-          <a:bodyPr wrap="square">
-            <a:spAutoFit/>
-          </a:bodyPr>
-          <a:lstStyle/>
-          <a:p>
-            <a:r>
-              <a:rPr lang="en-US" sz="1200" dirty="0"/>
-              <a:t>value of a</a:t>
             </a:r>
           </a:p>
         </p:txBody>
@@ -4646,8 +4577,8 @@
         </p:nvSpPr>
         <p:spPr>
           <a:xfrm>
-            <a:off x="2830087" y="5427244"/>
-            <a:ext cx="628505" cy="276999"/>
+            <a:off x="3575531" y="5447526"/>
+            <a:ext cx="665118" cy="292388"/>
           </a:xfrm>
           <a:prstGeom prst="rect">
             <a:avLst/>
@@ -4660,7 +4591,7 @@
           <a:lstStyle/>
           <a:p>
             <a:r>
-              <a:rPr lang="en-US" sz="1200" dirty="0"/>
+              <a:rPr lang="en-US" sz="1300" dirty="0"/>
               <a:t>SALIDA</a:t>
             </a:r>
           </a:p>
@@ -4680,8 +4611,8 @@
         </p:nvSpPr>
         <p:spPr>
           <a:xfrm>
-            <a:off x="2234880" y="5427245"/>
-            <a:ext cx="338554" cy="276999"/>
+            <a:off x="2980324" y="5447527"/>
+            <a:ext cx="351378" cy="292388"/>
           </a:xfrm>
           <a:prstGeom prst="rect">
             <a:avLst/>
@@ -4694,7 +4625,7 @@
           <a:lstStyle/>
           <a:p>
             <a:r>
-              <a:rPr lang="en-US" sz="1200" dirty="0"/>
+              <a:rPr lang="en-US" sz="1300" dirty="0"/>
               <a:t>&lt;&lt;</a:t>
             </a:r>
           </a:p>
@@ -4714,8 +4645,8 @@
         </p:nvSpPr>
         <p:spPr>
           <a:xfrm>
-            <a:off x="676850" y="5427243"/>
-            <a:ext cx="1311706" cy="276999"/>
+            <a:off x="1422294" y="5447525"/>
+            <a:ext cx="1404552" cy="292388"/>
           </a:xfrm>
           <a:prstGeom prst="rect">
             <a:avLst/>
@@ -4728,10 +4659,10 @@
           <a:lstStyle/>
           <a:p>
             <a:r>
-              <a:rPr lang="es-ES" sz="1200" dirty="0"/>
+              <a:rPr lang="es-ES" sz="1300" dirty="0"/>
               <a:t>IDENTIFICADORES</a:t>
             </a:r>
-            <a:endParaRPr lang="en-US" sz="1200" dirty="0"/>
+            <a:endParaRPr lang="en-US" sz="1300" dirty="0"/>
           </a:p>
         </p:txBody>
       </p:sp>
@@ -4749,8 +4680,8 @@
         </p:nvSpPr>
         <p:spPr>
           <a:xfrm>
-            <a:off x="1208825" y="6296800"/>
-            <a:ext cx="258404" cy="276999"/>
+            <a:off x="1992253" y="6330157"/>
+            <a:ext cx="264816" cy="292388"/>
           </a:xfrm>
           <a:prstGeom prst="rect">
             <a:avLst/>
@@ -4764,10 +4695,10 @@
           <a:lstStyle/>
           <a:p>
             <a:r>
-              <a:rPr lang="es-ES" sz="1200" dirty="0"/>
+              <a:rPr lang="es-ES" sz="1300" dirty="0"/>
               <a:t>a</a:t>
             </a:r>
-            <a:endParaRPr lang="en-US" sz="1200" dirty="0"/>
+            <a:endParaRPr lang="en-US" sz="1300" dirty="0"/>
           </a:p>
         </p:txBody>
       </p:sp>
@@ -4785,8 +4716,8 @@
         </p:nvSpPr>
         <p:spPr>
           <a:xfrm>
-            <a:off x="2916552" y="6299494"/>
-            <a:ext cx="455574" cy="276999"/>
+            <a:off x="3691269" y="6350622"/>
+            <a:ext cx="481222" cy="292388"/>
           </a:xfrm>
           <a:prstGeom prst="rect">
             <a:avLst/>
@@ -4800,10 +4731,10 @@
           <a:lstStyle/>
           <a:p>
             <a:r>
-              <a:rPr lang="es-ES" sz="1200" dirty="0"/>
+              <a:rPr lang="es-ES" sz="1300" dirty="0"/>
               <a:t>Endl</a:t>
             </a:r>
-            <a:endParaRPr lang="en-US" sz="1200" dirty="0"/>
+            <a:endParaRPr lang="en-US" sz="1300" dirty="0"/>
           </a:p>
         </p:txBody>
       </p:sp>
@@ -4824,12 +4755,17 @@
         </p:nvCxnSpPr>
         <p:spPr>
           <a:xfrm flipH="1">
-            <a:off x="1332703" y="4906227"/>
-            <a:ext cx="1811638" cy="521016"/>
+            <a:off x="2124570" y="4890797"/>
+            <a:ext cx="428900" cy="556728"/>
           </a:xfrm>
           <a:prstGeom prst="line">
             <a:avLst/>
           </a:prstGeom>
+          <a:ln>
+            <a:solidFill>
+              <a:schemeClr val="accent2"/>
+            </a:solidFill>
+          </a:ln>
         </p:spPr>
         <p:style>
           <a:lnRef idx="1">
@@ -4862,13 +4798,18 @@
           <p:nvPr/>
         </p:nvCxnSpPr>
         <p:spPr>
-          <a:xfrm flipH="1">
-            <a:off x="2404157" y="4906227"/>
-            <a:ext cx="740184" cy="521018"/>
+          <a:xfrm>
+            <a:off x="2553470" y="4890797"/>
+            <a:ext cx="602543" cy="556730"/>
           </a:xfrm>
           <a:prstGeom prst="line">
             <a:avLst/>
           </a:prstGeom>
+          <a:ln>
+            <a:solidFill>
+              <a:schemeClr val="accent2"/>
+            </a:solidFill>
+          </a:ln>
         </p:spPr>
         <p:style>
           <a:lnRef idx="1">
@@ -4901,13 +4842,18 @@
           <p:nvPr/>
         </p:nvCxnSpPr>
         <p:spPr>
-          <a:xfrm flipH="1">
-            <a:off x="3144340" y="4906227"/>
-            <a:ext cx="1" cy="521017"/>
+          <a:xfrm>
+            <a:off x="2553470" y="4890797"/>
+            <a:ext cx="1354620" cy="556729"/>
           </a:xfrm>
           <a:prstGeom prst="line">
             <a:avLst/>
           </a:prstGeom>
+          <a:ln>
+            <a:solidFill>
+              <a:schemeClr val="accent2"/>
+            </a:solidFill>
+          </a:ln>
         </p:spPr>
         <p:style>
           <a:lnRef idx="1">
@@ -4940,9 +4886,9 @@
           <p:nvPr/>
         </p:nvCxnSpPr>
         <p:spPr>
-          <a:xfrm flipH="1">
-            <a:off x="3144339" y="5704243"/>
-            <a:ext cx="1" cy="595251"/>
+          <a:xfrm>
+            <a:off x="3908090" y="5739914"/>
+            <a:ext cx="23790" cy="610708"/>
           </a:xfrm>
           <a:prstGeom prst="line">
             <a:avLst/>
@@ -4980,8 +4926,8 @@
         </p:nvCxnSpPr>
         <p:spPr>
           <a:xfrm>
-            <a:off x="10916897" y="3872093"/>
-            <a:ext cx="0" cy="761647"/>
+            <a:off x="11000990" y="3887482"/>
+            <a:ext cx="0" cy="746253"/>
           </a:xfrm>
           <a:prstGeom prst="line">
             <a:avLst/>
@@ -5018,13 +4964,18 @@
           <p:nvPr/>
         </p:nvCxnSpPr>
         <p:spPr>
-          <a:xfrm>
-            <a:off x="8843448" y="3884236"/>
-            <a:ext cx="0" cy="749504"/>
+          <a:xfrm flipH="1">
+            <a:off x="8797288" y="3887479"/>
+            <a:ext cx="1" cy="746256"/>
           </a:xfrm>
           <a:prstGeom prst="line">
             <a:avLst/>
           </a:prstGeom>
+          <a:ln>
+            <a:solidFill>
+              <a:schemeClr val="accent4"/>
+            </a:solidFill>
+          </a:ln>
         </p:spPr>
         <p:style>
           <a:lnRef idx="1">
@@ -5058,12 +5009,17 @@
         </p:nvCxnSpPr>
         <p:spPr>
           <a:xfrm>
-            <a:off x="6683211" y="3872091"/>
-            <a:ext cx="10924" cy="761644"/>
+            <a:off x="6644949" y="3870595"/>
+            <a:ext cx="0" cy="763140"/>
           </a:xfrm>
           <a:prstGeom prst="line">
             <a:avLst/>
           </a:prstGeom>
+          <a:ln>
+            <a:solidFill>
+              <a:schemeClr val="accent2"/>
+            </a:solidFill>
+          </a:ln>
         </p:spPr>
         <p:style>
           <a:lnRef idx="1">
@@ -5096,9 +5052,9 @@
           <p:nvPr/>
         </p:nvCxnSpPr>
         <p:spPr>
-          <a:xfrm>
-            <a:off x="6694135" y="4910734"/>
-            <a:ext cx="0" cy="521018"/>
+          <a:xfrm flipH="1">
+            <a:off x="6626628" y="4926123"/>
+            <a:ext cx="18321" cy="508926"/>
           </a:xfrm>
           <a:prstGeom prst="line">
             <a:avLst/>
@@ -5137,8 +5093,8 @@
         </p:nvCxnSpPr>
         <p:spPr>
           <a:xfrm>
-            <a:off x="1906204" y="3877938"/>
-            <a:ext cx="1238137" cy="751290"/>
+            <a:off x="1924510" y="3893327"/>
+            <a:ext cx="628960" cy="705082"/>
           </a:xfrm>
           <a:prstGeom prst="line">
             <a:avLst/>
@@ -5176,47 +5132,8 @@
         </p:nvCxnSpPr>
         <p:spPr>
           <a:xfrm>
-            <a:off x="1906204" y="3877938"/>
-            <a:ext cx="645442" cy="751291"/>
-          </a:xfrm>
-          <a:prstGeom prst="line">
-            <a:avLst/>
-          </a:prstGeom>
-        </p:spPr>
-        <p:style>
-          <a:lnRef idx="1">
-            <a:schemeClr val="accent1"/>
-          </a:lnRef>
-          <a:fillRef idx="0">
-            <a:schemeClr val="accent1"/>
-          </a:fillRef>
-          <a:effectRef idx="0">
-            <a:schemeClr val="accent1"/>
-          </a:effectRef>
-          <a:fontRef idx="minor">
-            <a:schemeClr val="tx1"/>
-          </a:fontRef>
-        </p:style>
-      </p:cxnSp>
-      <p:cxnSp>
-        <p:nvCxnSpPr>
-          <p:cNvPr id="127" name="Conector recto 126">
-            <a:extLst>
-              <a:ext uri="{FF2B5EF4-FFF2-40B4-BE49-F238E27FC236}">
-                <a16:creationId xmlns:a16="http://schemas.microsoft.com/office/drawing/2014/main" id="{83549501-4E20-420A-81AA-194736B4EA81}"/>
-              </a:ext>
-            </a:extLst>
-          </p:cNvPr>
-          <p:cNvCxnSpPr>
-            <a:stCxn id="47" idx="2"/>
-            <a:endCxn id="62" idx="0"/>
-          </p:cNvCxnSpPr>
-          <p:nvPr/>
-        </p:nvCxnSpPr>
-        <p:spPr>
-          <a:xfrm>
-            <a:off x="1906204" y="3877938"/>
-            <a:ext cx="100680" cy="751292"/>
+            <a:off x="1924510" y="3893327"/>
+            <a:ext cx="24371" cy="705083"/>
           </a:xfrm>
           <a:prstGeom prst="line">
             <a:avLst/>
@@ -5248,54 +5165,14 @@
           </p:cNvPr>
           <p:cNvCxnSpPr>
             <a:stCxn id="47" idx="2"/>
-            <a:endCxn id="64" idx="0"/>
+            <a:endCxn id="168" idx="0"/>
           </p:cNvCxnSpPr>
           <p:nvPr/>
         </p:nvCxnSpPr>
         <p:spPr>
           <a:xfrm flipH="1">
-            <a:off x="1204806" y="3877938"/>
-            <a:ext cx="701398" cy="753268"/>
-          </a:xfrm>
-          <a:prstGeom prst="line">
-            <a:avLst/>
-          </a:prstGeom>
-        </p:spPr>
-        <p:style>
-          <a:lnRef idx="1">
-            <a:schemeClr val="accent1"/>
-          </a:lnRef>
-          <a:fillRef idx="0">
-            <a:schemeClr val="accent1"/>
-          </a:fillRef>
-          <a:effectRef idx="0">
-            <a:schemeClr val="accent1"/>
-          </a:effectRef>
-          <a:fontRef idx="minor">
-            <a:schemeClr val="tx1"/>
-          </a:fontRef>
-        </p:style>
-      </p:cxnSp>
-      <p:cxnSp>
-        <p:nvCxnSpPr>
-          <p:cNvPr id="133" name="Conector recto 132">
-            <a:extLst>
-              <a:ext uri="{FF2B5EF4-FFF2-40B4-BE49-F238E27FC236}">
-                <a16:creationId xmlns:a16="http://schemas.microsoft.com/office/drawing/2014/main" id="{A91B76CC-D075-4AAF-80B2-B5051BFC8051}"/>
-              </a:ext>
-            </a:extLst>
-          </p:cNvPr>
-          <p:cNvCxnSpPr>
-            <a:cxnSpLocks/>
-            <a:stCxn id="47" idx="2"/>
-            <a:endCxn id="63" idx="0"/>
-          </p:cNvCxnSpPr>
-          <p:nvPr/>
-        </p:nvCxnSpPr>
-        <p:spPr>
-          <a:xfrm flipH="1">
-            <a:off x="402728" y="3877938"/>
-            <a:ext cx="1503476" cy="751291"/>
+            <a:off x="721289" y="3893327"/>
+            <a:ext cx="1203221" cy="736736"/>
           </a:xfrm>
           <a:prstGeom prst="line">
             <a:avLst/>
@@ -5331,7 +5208,7 @@
         <p:spPr>
           <a:xfrm>
             <a:off x="2177401" y="3584446"/>
-            <a:ext cx="226344" cy="276999"/>
+            <a:ext cx="229550" cy="292388"/>
           </a:xfrm>
           <a:prstGeom prst="rect">
             <a:avLst/>
@@ -5344,7 +5221,7 @@
           <a:lstStyle/>
           <a:p>
             <a:r>
-              <a:rPr lang="en-US" sz="1200" dirty="0"/>
+              <a:rPr lang="en-US" sz="1300" dirty="0"/>
               <a:t>;</a:t>
             </a:r>
           </a:p>
@@ -5367,12 +5244,17 @@
         </p:nvCxnSpPr>
         <p:spPr>
           <a:xfrm>
-            <a:off x="1963684" y="2708432"/>
-            <a:ext cx="326889" cy="876014"/>
+            <a:off x="1300388" y="2738886"/>
+            <a:ext cx="991788" cy="845560"/>
           </a:xfrm>
           <a:prstGeom prst="line">
             <a:avLst/>
           </a:prstGeom>
+          <a:ln>
+            <a:solidFill>
+              <a:schemeClr val="accent4"/>
+            </a:solidFill>
+          </a:ln>
         </p:spPr>
         <p:style>
           <a:lnRef idx="1">
@@ -5403,8 +5285,8 @@
         </p:nvSpPr>
         <p:spPr>
           <a:xfrm>
-            <a:off x="2930090" y="2429455"/>
-            <a:ext cx="2433680" cy="276999"/>
+            <a:off x="3105820" y="2442941"/>
+            <a:ext cx="2616742" cy="292388"/>
           </a:xfrm>
           <a:prstGeom prst="rect">
             <a:avLst/>
@@ -5418,10 +5300,10 @@
           <a:lstStyle/>
           <a:p>
             <a:r>
-              <a:rPr lang="es-ES" sz="1200" dirty="0"/>
+              <a:rPr lang="es-ES" sz="1300" dirty="0"/>
               <a:t>OPERACIONES_COMPLEMENTARIAS</a:t>
             </a:r>
-            <a:endParaRPr lang="en-US" sz="1200" dirty="0"/>
+            <a:endParaRPr lang="en-US" sz="1300" dirty="0"/>
           </a:p>
         </p:txBody>
       </p:sp>
@@ -5442,12 +5324,17 @@
         </p:nvCxnSpPr>
         <p:spPr>
           <a:xfrm>
-            <a:off x="3719249" y="1852170"/>
-            <a:ext cx="427681" cy="577285"/>
+            <a:off x="2397230" y="1882025"/>
+            <a:ext cx="2016961" cy="560916"/>
           </a:xfrm>
           <a:prstGeom prst="line">
             <a:avLst/>
           </a:prstGeom>
+          <a:ln>
+            <a:solidFill>
+              <a:schemeClr val="accent6"/>
+            </a:solidFill>
+          </a:ln>
         </p:spPr>
         <p:style>
           <a:lnRef idx="1">
@@ -5479,7 +5366,7 @@
         <p:spPr>
           <a:xfrm>
             <a:off x="2868363" y="3584445"/>
-            <a:ext cx="1311706" cy="276999"/>
+            <a:ext cx="1404552" cy="292388"/>
           </a:xfrm>
           <a:prstGeom prst="rect">
             <a:avLst/>
@@ -5492,7 +5379,7 @@
           <a:lstStyle/>
           <a:p>
             <a:r>
-              <a:rPr lang="en-US" sz="1200" dirty="0"/>
+              <a:rPr lang="en-US" sz="1300" dirty="0"/>
               <a:t>IDENTIFICADORES</a:t>
             </a:r>
           </a:p>
@@ -5515,12 +5402,17 @@
         </p:nvCxnSpPr>
         <p:spPr>
           <a:xfrm flipH="1">
-            <a:off x="3524216" y="2706454"/>
-            <a:ext cx="622714" cy="877991"/>
+            <a:off x="3570639" y="2735329"/>
+            <a:ext cx="843552" cy="849116"/>
           </a:xfrm>
           <a:prstGeom prst="line">
             <a:avLst/>
           </a:prstGeom>
+          <a:ln>
+            <a:solidFill>
+              <a:schemeClr val="accent2"/>
+            </a:solidFill>
+          </a:ln>
         </p:spPr>
         <p:style>
           <a:lnRef idx="1">
@@ -5551,8 +5443,8 @@
         </p:nvSpPr>
         <p:spPr>
           <a:xfrm>
-            <a:off x="4434487" y="3584445"/>
-            <a:ext cx="339708" cy="276999"/>
+            <a:off x="4237893" y="3597645"/>
+            <a:ext cx="352597" cy="292388"/>
           </a:xfrm>
           <a:prstGeom prst="rect">
             <a:avLst/>
@@ -5565,10 +5457,10 @@
           <a:lstStyle/>
           <a:p>
             <a:r>
-              <a:rPr lang="es-ES" sz="1200" dirty="0"/>
+              <a:rPr lang="es-ES" sz="1300" dirty="0"/>
               <a:t>++</a:t>
             </a:r>
-            <a:endParaRPr lang="en-US" sz="1200" dirty="0"/>
+            <a:endParaRPr lang="en-US" sz="1300" dirty="0"/>
           </a:p>
         </p:txBody>
       </p:sp>
@@ -5589,12 +5481,17 @@
         </p:nvCxnSpPr>
         <p:spPr>
           <a:xfrm>
-            <a:off x="4146930" y="2706454"/>
-            <a:ext cx="457411" cy="877991"/>
+            <a:off x="4414191" y="2735329"/>
+            <a:ext cx="1" cy="862316"/>
           </a:xfrm>
           <a:prstGeom prst="line">
             <a:avLst/>
           </a:prstGeom>
+          <a:ln>
+            <a:solidFill>
+              <a:schemeClr val="accent2"/>
+            </a:solidFill>
+          </a:ln>
         </p:spPr>
         <p:style>
           <a:lnRef idx="1">
@@ -5625,8 +5522,8 @@
         </p:nvSpPr>
         <p:spPr>
           <a:xfrm>
-            <a:off x="4152430" y="4629228"/>
-            <a:ext cx="258404" cy="276999"/>
+            <a:off x="3440622" y="4633735"/>
+            <a:ext cx="264816" cy="292388"/>
           </a:xfrm>
           <a:prstGeom prst="rect">
             <a:avLst/>
@@ -5640,10 +5537,10 @@
           <a:lstStyle/>
           <a:p>
             <a:r>
-              <a:rPr lang="es-ES" sz="1200" dirty="0"/>
+              <a:rPr lang="es-ES" sz="1300" dirty="0"/>
               <a:t>a</a:t>
             </a:r>
-            <a:endParaRPr lang="en-US" sz="1200" dirty="0"/>
+            <a:endParaRPr lang="en-US" sz="1300" dirty="0"/>
           </a:p>
         </p:txBody>
       </p:sp>
@@ -5664,12 +5561,17 @@
         </p:nvCxnSpPr>
         <p:spPr>
           <a:xfrm>
-            <a:off x="3524216" y="3861444"/>
-            <a:ext cx="757416" cy="767784"/>
+            <a:off x="3570639" y="3876833"/>
+            <a:ext cx="2391" cy="756902"/>
           </a:xfrm>
           <a:prstGeom prst="line">
             <a:avLst/>
           </a:prstGeom>
+          <a:ln>
+            <a:solidFill>
+              <a:schemeClr val="accent6"/>
+            </a:solidFill>
+          </a:ln>
         </p:spPr>
         <p:style>
           <a:lnRef idx="1">
@@ -5701,7 +5603,7 @@
         <p:spPr>
           <a:xfrm>
             <a:off x="4990449" y="3609111"/>
-            <a:ext cx="226344" cy="276999"/>
+            <a:ext cx="229550" cy="292388"/>
           </a:xfrm>
           <a:prstGeom prst="rect">
             <a:avLst/>
@@ -5714,7 +5616,7 @@
           <a:lstStyle/>
           <a:p>
             <a:r>
-              <a:rPr lang="en-US" sz="1200" dirty="0"/>
+              <a:rPr lang="en-US" sz="1300" dirty="0"/>
               <a:t>;</a:t>
             </a:r>
           </a:p>
@@ -5737,12 +5639,17 @@
         </p:nvCxnSpPr>
         <p:spPr>
           <a:xfrm>
-            <a:off x="4146930" y="2706454"/>
-            <a:ext cx="956691" cy="902657"/>
+            <a:off x="4414191" y="2735329"/>
+            <a:ext cx="691033" cy="873782"/>
           </a:xfrm>
           <a:prstGeom prst="line">
             <a:avLst/>
           </a:prstGeom>
+          <a:ln>
+            <a:solidFill>
+              <a:schemeClr val="accent2"/>
+            </a:solidFill>
+          </a:ln>
         </p:spPr>
         <p:style>
           <a:lnRef idx="1">
@@ -5776,12 +5683,133 @@
         </p:nvCxnSpPr>
         <p:spPr>
           <a:xfrm flipH="1" flipV="1">
-            <a:off x="1332703" y="5704242"/>
-            <a:ext cx="5324" cy="592558"/>
+            <a:off x="2124570" y="5739913"/>
+            <a:ext cx="91" cy="590244"/>
           </a:xfrm>
           <a:prstGeom prst="line">
             <a:avLst/>
           </a:prstGeom>
+          <a:ln>
+            <a:solidFill>
+              <a:schemeClr val="accent4"/>
+            </a:solidFill>
+          </a:ln>
+        </p:spPr>
+        <p:style>
+          <a:lnRef idx="1">
+            <a:schemeClr val="accent1"/>
+          </a:lnRef>
+          <a:fillRef idx="0">
+            <a:schemeClr val="accent1"/>
+          </a:fillRef>
+          <a:effectRef idx="0">
+            <a:schemeClr val="accent1"/>
+          </a:effectRef>
+          <a:fontRef idx="minor">
+            <a:schemeClr val="tx1"/>
+          </a:fontRef>
+        </p:style>
+      </p:cxnSp>
+      <p:sp>
+        <p:nvSpPr>
+          <p:cNvPr id="167" name="Rectángulo 166">
+            <a:extLst>
+              <a:ext uri="{FF2B5EF4-FFF2-40B4-BE49-F238E27FC236}">
+                <a16:creationId xmlns:a16="http://schemas.microsoft.com/office/drawing/2014/main" id="{7095932A-FA86-43B6-9455-AA8A59C76867}"/>
+              </a:ext>
+            </a:extLst>
+          </p:cNvPr>
+          <p:cNvSpPr/>
+          <p:nvPr/>
+        </p:nvSpPr>
+        <p:spPr>
+          <a:xfrm>
+            <a:off x="216514" y="5435049"/>
+            <a:ext cx="1022023" cy="292388"/>
+          </a:xfrm>
+          <a:prstGeom prst="rect">
+            <a:avLst/>
+          </a:prstGeom>
+        </p:spPr>
+        <p:txBody>
+          <a:bodyPr wrap="square">
+            <a:spAutoFit/>
+          </a:bodyPr>
+          <a:lstStyle/>
+          <a:p>
+            <a:r>
+              <a:rPr lang="en-US" sz="1300" dirty="0" smtClean="0"/>
+              <a:t>“value </a:t>
+            </a:r>
+            <a:r>
+              <a:rPr lang="en-US" sz="1300" dirty="0"/>
+              <a:t>of </a:t>
+            </a:r>
+            <a:r>
+              <a:rPr lang="en-US" sz="1300" dirty="0" smtClean="0"/>
+              <a:t>a”</a:t>
+            </a:r>
+            <a:endParaRPr lang="en-US" sz="1300" dirty="0"/>
+          </a:p>
+        </p:txBody>
+      </p:sp>
+      <p:sp>
+        <p:nvSpPr>
+          <p:cNvPr id="168" name="Rectángulo 167">
+            <a:extLst>
+              <a:ext uri="{FF2B5EF4-FFF2-40B4-BE49-F238E27FC236}">
+                <a16:creationId xmlns:a16="http://schemas.microsoft.com/office/drawing/2014/main" id="{B637EE8D-2F40-4790-A46A-3596E7EDA7F5}"/>
+              </a:ext>
+            </a:extLst>
+          </p:cNvPr>
+          <p:cNvSpPr/>
+          <p:nvPr/>
+        </p:nvSpPr>
+        <p:spPr>
+          <a:xfrm>
+            <a:off x="70085" y="4630063"/>
+            <a:ext cx="1302408" cy="292388"/>
+          </a:xfrm>
+          <a:prstGeom prst="rect">
+            <a:avLst/>
+          </a:prstGeom>
+        </p:spPr>
+        <p:txBody>
+          <a:bodyPr wrap="none">
+            <a:spAutoFit/>
+          </a:bodyPr>
+          <a:lstStyle/>
+          <a:p>
+            <a:r>
+              <a:rPr lang="en-US" sz="1300" dirty="0"/>
+              <a:t>STRING_LITERAL</a:t>
+            </a:r>
+            <a:endParaRPr lang="en-US" sz="1300" dirty="0"/>
+          </a:p>
+        </p:txBody>
+      </p:sp>
+      <p:cxnSp>
+        <p:nvCxnSpPr>
+          <p:cNvPr id="166" name="Conector recto 165"/>
+          <p:cNvCxnSpPr>
+            <a:stCxn id="168" idx="2"/>
+            <a:endCxn id="167" idx="0"/>
+          </p:cNvCxnSpPr>
+          <p:nvPr/>
+        </p:nvCxnSpPr>
+        <p:spPr>
+          <a:xfrm>
+            <a:off x="721289" y="4922451"/>
+            <a:ext cx="6237" cy="512598"/>
+          </a:xfrm>
+          <a:prstGeom prst="line">
+            <a:avLst/>
+          </a:prstGeom>
+          <a:ln>
+            <a:solidFill>
+              <a:schemeClr val="accent6"/>
+            </a:solidFill>
+          </a:ln>
         </p:spPr>
         <p:style>
           <a:lnRef idx="1">

</xml_diff>